<commit_message>
Add PDF of presentation.
</commit_message>
<xml_diff>
--- a/2017-11-sc17-ompi-bof/ompix-bernholdt-v01.pptx
+++ b/2017-11-sc17-ompi-bof/ompix-bernholdt-v01.pptx
@@ -27,7 +27,7 @@
     <p:sldId id="325" r:id="rId18"/>
   </p:sldIdLst>
   <p:sldSz cx="12188825" cy="6858000"/>
-  <p:notesSz cx="7010400" cy="9296400"/>
+  <p:notesSz cx="4683125" cy="8686800"/>
   <p:defaultTextStyle>
     <a:defPPr>
       <a:defRPr lang="en-US"/>
@@ -170,12 +170,12 @@
     </p:ext>
     <p:ext uri="{2D200454-40CA-4A62-9FC3-DE9A4176ACB9}">
       <p15:notesGuideLst xmlns:p15="http://schemas.microsoft.com/office/powerpoint/2012/main">
-        <p15:guide id="1" orient="horz" pos="2928">
+        <p15:guide id="1" orient="horz" pos="2736" userDrawn="1">
           <p15:clr>
             <a:srgbClr val="A4A3A4"/>
           </p15:clr>
         </p15:guide>
-        <p15:guide id="2" pos="2208">
+        <p15:guide id="2" pos="1475" userDrawn="1">
           <p15:clr>
             <a:srgbClr val="A4A3A4"/>
           </p15:clr>
@@ -225,17 +225,17 @@
         <p:spPr>
           <a:xfrm>
             <a:off x="0" y="0"/>
-            <a:ext cx="3038475" cy="465138"/>
+            <a:ext cx="2029779" cy="434637"/>
           </a:xfrm>
           <a:prstGeom prst="rect">
             <a:avLst/>
           </a:prstGeom>
         </p:spPr>
         <p:txBody>
-          <a:bodyPr vert="horz" lIns="91440" tIns="45720" rIns="91440" bIns="45720" rtlCol="0"/>
+          <a:bodyPr vert="horz" lIns="74961" tIns="37480" rIns="74961" bIns="37480" rtlCol="0"/>
           <a:lstStyle>
             <a:lvl1pPr algn="l">
-              <a:defRPr sz="1200"/>
+              <a:defRPr sz="900"/>
             </a:lvl1pPr>
           </a:lstStyle>
           <a:p>
@@ -255,18 +255,18 @@
         </p:nvSpPr>
         <p:spPr>
           <a:xfrm>
-            <a:off x="3970338" y="0"/>
-            <a:ext cx="3038475" cy="465138"/>
+            <a:off x="2652287" y="0"/>
+            <a:ext cx="2029779" cy="434637"/>
           </a:xfrm>
           <a:prstGeom prst="rect">
             <a:avLst/>
           </a:prstGeom>
         </p:spPr>
         <p:txBody>
-          <a:bodyPr vert="horz" lIns="91440" tIns="45720" rIns="91440" bIns="45720" rtlCol="0"/>
+          <a:bodyPr vert="horz" lIns="74961" tIns="37480" rIns="74961" bIns="37480" rtlCol="0"/>
           <a:lstStyle>
             <a:lvl1pPr algn="r">
-              <a:defRPr sz="1200"/>
+              <a:defRPr sz="900"/>
             </a:lvl1pPr>
           </a:lstStyle>
           <a:p>
@@ -290,18 +290,18 @@
         </p:nvSpPr>
         <p:spPr>
           <a:xfrm>
-            <a:off x="0" y="8829675"/>
-            <a:ext cx="3038475" cy="465138"/>
+            <a:off x="0" y="8250680"/>
+            <a:ext cx="2029779" cy="434637"/>
           </a:xfrm>
           <a:prstGeom prst="rect">
             <a:avLst/>
           </a:prstGeom>
         </p:spPr>
         <p:txBody>
-          <a:bodyPr vert="horz" lIns="91440" tIns="45720" rIns="91440" bIns="45720" rtlCol="0" anchor="b"/>
+          <a:bodyPr vert="horz" lIns="74961" tIns="37480" rIns="74961" bIns="37480" rtlCol="0" anchor="b"/>
           <a:lstStyle>
             <a:lvl1pPr algn="l">
-              <a:defRPr sz="1200"/>
+              <a:defRPr sz="900"/>
             </a:lvl1pPr>
           </a:lstStyle>
           <a:p>
@@ -321,18 +321,18 @@
         </p:nvSpPr>
         <p:spPr>
           <a:xfrm>
-            <a:off x="3970338" y="8829675"/>
-            <a:ext cx="3038475" cy="465138"/>
+            <a:off x="2652287" y="8250680"/>
+            <a:ext cx="2029779" cy="434637"/>
           </a:xfrm>
           <a:prstGeom prst="rect">
             <a:avLst/>
           </a:prstGeom>
         </p:spPr>
         <p:txBody>
-          <a:bodyPr vert="horz" lIns="91440" tIns="45720" rIns="91440" bIns="45720" rtlCol="0" anchor="b"/>
+          <a:bodyPr vert="horz" lIns="74961" tIns="37480" rIns="74961" bIns="37480" rtlCol="0" anchor="b"/>
           <a:lstStyle>
             <a:lvl1pPr algn="r">
-              <a:defRPr sz="1200"/>
+              <a:defRPr sz="900"/>
             </a:lvl1pPr>
           </a:lstStyle>
           <a:p>
@@ -390,17 +390,17 @@
         <p:spPr>
           <a:xfrm>
             <a:off x="0" y="0"/>
-            <a:ext cx="3038475" cy="465138"/>
+            <a:ext cx="2029779" cy="434637"/>
           </a:xfrm>
           <a:prstGeom prst="rect">
             <a:avLst/>
           </a:prstGeom>
         </p:spPr>
         <p:txBody>
-          <a:bodyPr vert="horz" lIns="91440" tIns="45720" rIns="91440" bIns="45720" rtlCol="0"/>
+          <a:bodyPr vert="horz" lIns="74961" tIns="37480" rIns="74961" bIns="37480" rtlCol="0"/>
           <a:lstStyle>
             <a:lvl1pPr algn="l">
-              <a:defRPr sz="1200"/>
+              <a:defRPr sz="900"/>
             </a:lvl1pPr>
           </a:lstStyle>
           <a:p>
@@ -420,18 +420,18 @@
         </p:nvSpPr>
         <p:spPr>
           <a:xfrm>
-            <a:off x="3970338" y="0"/>
-            <a:ext cx="3038475" cy="465138"/>
+            <a:off x="2652287" y="0"/>
+            <a:ext cx="2029779" cy="434637"/>
           </a:xfrm>
           <a:prstGeom prst="rect">
             <a:avLst/>
           </a:prstGeom>
         </p:spPr>
         <p:txBody>
-          <a:bodyPr vert="horz" lIns="91440" tIns="45720" rIns="91440" bIns="45720" rtlCol="0"/>
+          <a:bodyPr vert="horz" lIns="74961" tIns="37480" rIns="74961" bIns="37480" rtlCol="0"/>
           <a:lstStyle>
             <a:lvl1pPr algn="r">
-              <a:defRPr sz="1200"/>
+              <a:defRPr sz="900"/>
             </a:lvl1pPr>
           </a:lstStyle>
           <a:p>
@@ -455,8 +455,8 @@
         </p:nvSpPr>
         <p:spPr>
           <a:xfrm>
-            <a:off x="407988" y="696913"/>
-            <a:ext cx="6194425" cy="3486150"/>
+            <a:off x="-552450" y="650875"/>
+            <a:ext cx="5788025" cy="3257550"/>
           </a:xfrm>
           <a:prstGeom prst="rect">
             <a:avLst/>
@@ -469,7 +469,7 @@
           </a:ln>
         </p:spPr>
         <p:txBody>
-          <a:bodyPr vert="horz" lIns="91440" tIns="45720" rIns="91440" bIns="45720" rtlCol="0" anchor="ctr"/>
+          <a:bodyPr vert="horz" lIns="74961" tIns="37480" rIns="74961" bIns="37480" rtlCol="0" anchor="ctr"/>
           <a:lstStyle/>
           <a:p>
             <a:endParaRPr lang="en-US"/>
@@ -488,15 +488,15 @@
         </p:nvSpPr>
         <p:spPr>
           <a:xfrm>
-            <a:off x="701675" y="4416425"/>
-            <a:ext cx="5607050" cy="4183063"/>
+            <a:off x="468737" y="4126824"/>
+            <a:ext cx="3745652" cy="3908764"/>
           </a:xfrm>
           <a:prstGeom prst="rect">
             <a:avLst/>
           </a:prstGeom>
         </p:spPr>
         <p:txBody>
-          <a:bodyPr vert="horz" lIns="91440" tIns="45720" rIns="91440" bIns="45720" rtlCol="0"/>
+          <a:bodyPr vert="horz" lIns="74961" tIns="37480" rIns="74961" bIns="37480" rtlCol="0"/>
           <a:lstStyle/>
           <a:p>
             <a:pPr lvl="0"/>
@@ -547,18 +547,18 @@
         </p:nvSpPr>
         <p:spPr>
           <a:xfrm>
-            <a:off x="0" y="8829675"/>
-            <a:ext cx="3038475" cy="465138"/>
+            <a:off x="0" y="8250680"/>
+            <a:ext cx="2029779" cy="434637"/>
           </a:xfrm>
           <a:prstGeom prst="rect">
             <a:avLst/>
           </a:prstGeom>
         </p:spPr>
         <p:txBody>
-          <a:bodyPr vert="horz" lIns="91440" tIns="45720" rIns="91440" bIns="45720" rtlCol="0" anchor="b"/>
+          <a:bodyPr vert="horz" lIns="74961" tIns="37480" rIns="74961" bIns="37480" rtlCol="0" anchor="b"/>
           <a:lstStyle>
             <a:lvl1pPr algn="l">
-              <a:defRPr sz="1200"/>
+              <a:defRPr sz="900"/>
             </a:lvl1pPr>
           </a:lstStyle>
           <a:p>
@@ -578,18 +578,18 @@
         </p:nvSpPr>
         <p:spPr>
           <a:xfrm>
-            <a:off x="3970338" y="8829675"/>
-            <a:ext cx="3038475" cy="465138"/>
+            <a:off x="2652287" y="8250680"/>
+            <a:ext cx="2029779" cy="434637"/>
           </a:xfrm>
           <a:prstGeom prst="rect">
             <a:avLst/>
           </a:prstGeom>
         </p:spPr>
         <p:txBody>
-          <a:bodyPr vert="horz" lIns="91440" tIns="45720" rIns="91440" bIns="45720" rtlCol="0" anchor="b"/>
+          <a:bodyPr vert="horz" lIns="74961" tIns="37480" rIns="74961" bIns="37480" rtlCol="0" anchor="b"/>
           <a:lstStyle>
             <a:lvl1pPr algn="r">
-              <a:defRPr sz="1200"/>
+              <a:defRPr sz="900"/>
             </a:lvl1pPr>
           </a:lstStyle>
           <a:p>
@@ -9347,21 +9347,6 @@
 </file>
 
 <file path=customXml/item1.xml><?xml version="1.0" encoding="utf-8"?>
-<p:properties xmlns:p="http://schemas.microsoft.com/office/2006/metadata/properties" xmlns:xsi="http://www.w3.org/2001/XMLSchema-instance" xmlns:pc="http://schemas.microsoft.com/office/infopath/2007/PartnerControls">
-  <documentManagement/>
-</p:properties>
-</file>
-
-<file path=customXml/item2.xml><?xml version="1.0" encoding="utf-8"?>
-<?mso-contentType ?>
-<FormTemplates xmlns="http://schemas.microsoft.com/sharepoint/v3/contenttype/forms">
-  <Display>DocumentLibraryForm</Display>
-  <Edit>DocumentLibraryForm</Edit>
-  <New>DocumentLibraryForm</New>
-</FormTemplates>
-</file>
-
-<file path=customXml/item3.xml><?xml version="1.0" encoding="utf-8"?>
 <ct:contentTypeSchema xmlns:ct="http://schemas.microsoft.com/office/2006/metadata/contentType" xmlns:ma="http://schemas.microsoft.com/office/2006/metadata/properties/metaAttributes" ct:_="" ma:_="" ma:contentTypeName="Document" ma:contentTypeID="0x010100565464437F680748A68B85EB6594EA7D" ma:contentTypeVersion="0" ma:contentTypeDescription="Create a new document." ma:contentTypeScope="" ma:versionID="fe3f4dd58d5914c51cfc6deaa8ad845c">
   <xsd:schema xmlns:xsd="http://www.w3.org/2001/XMLSchema" xmlns:p="http://schemas.microsoft.com/office/2006/metadata/properties" targetNamespace="http://schemas.microsoft.com/office/2006/metadata/properties" ma:root="true" ma:fieldsID="4aeb20c0e3442673af7ee10786458764">
     <xsd:element name="properties">
@@ -9410,30 +9395,22 @@
 </ct:contentTypeSchema>
 </file>
 
-<file path=customXml/itemProps1.xml><?xml version="1.0" encoding="utf-8"?>
-<ds:datastoreItem xmlns:ds="http://schemas.openxmlformats.org/officeDocument/2006/customXml" ds:itemID="{A50EC660-24D0-43A0-AE5E-E274115E726B}">
-  <ds:schemaRefs>
-    <ds:schemaRef ds:uri="http://purl.org/dc/elements/1.1/"/>
-    <ds:schemaRef ds:uri="http://schemas.microsoft.com/office/2006/metadata/properties"/>
-    <ds:schemaRef ds:uri="http://purl.org/dc/terms/"/>
-    <ds:schemaRef ds:uri="http://schemas.openxmlformats.org/package/2006/metadata/core-properties"/>
-    <ds:schemaRef ds:uri="http://purl.org/dc/dcmitype/"/>
-    <ds:schemaRef ds:uri="http://schemas.microsoft.com/office/2006/documentManagement/types"/>
-    <ds:schemaRef ds:uri="http://www.w3.org/XML/1998/namespace"/>
-    <ds:schemaRef ds:uri="http://schemas.microsoft.com/office/infopath/2007/PartnerControls"/>
-  </ds:schemaRefs>
-</ds:datastoreItem>
+<file path=customXml/item2.xml><?xml version="1.0" encoding="utf-8"?>
+<p:properties xmlns:p="http://schemas.microsoft.com/office/2006/metadata/properties" xmlns:xsi="http://www.w3.org/2001/XMLSchema-instance" xmlns:pc="http://schemas.microsoft.com/office/infopath/2007/PartnerControls">
+  <documentManagement/>
+</p:properties>
 </file>
 
-<file path=customXml/itemProps2.xml><?xml version="1.0" encoding="utf-8"?>
-<ds:datastoreItem xmlns:ds="http://schemas.openxmlformats.org/officeDocument/2006/customXml" ds:itemID="{19E20559-B232-4371-8690-E3D8007EDB82}">
-  <ds:schemaRefs>
-    <ds:schemaRef ds:uri="http://schemas.microsoft.com/sharepoint/v3/contenttype/forms"/>
-  </ds:schemaRefs>
-</ds:datastoreItem>
+<file path=customXml/item3.xml><?xml version="1.0" encoding="utf-8"?>
+<?mso-contentType ?>
+<FormTemplates xmlns="http://schemas.microsoft.com/sharepoint/v3/contenttype/forms">
+  <Display>DocumentLibraryForm</Display>
+  <Edit>DocumentLibraryForm</Edit>
+  <New>DocumentLibraryForm</New>
+</FormTemplates>
 </file>
 
-<file path=customXml/itemProps3.xml><?xml version="1.0" encoding="utf-8"?>
+<file path=customXml/itemProps1.xml><?xml version="1.0" encoding="utf-8"?>
 <ds:datastoreItem xmlns:ds="http://schemas.openxmlformats.org/officeDocument/2006/customXml" ds:itemID="{E8DB7DEB-074E-4EE8-9B6E-FD277323109C}">
   <ds:schemaRefs>
     <ds:schemaRef ds:uri="http://schemas.microsoft.com/office/2006/metadata/contentType"/>
@@ -9446,4 +9423,26 @@
     <ds:schemaRef ds:uri="http://schemas.microsoft.com/office/internal/2005/internalDocumentation"/>
   </ds:schemaRefs>
 </ds:datastoreItem>
+</file>
+
+<file path=customXml/itemProps2.xml><?xml version="1.0" encoding="utf-8"?>
+<ds:datastoreItem xmlns:ds="http://schemas.openxmlformats.org/officeDocument/2006/customXml" ds:itemID="{A50EC660-24D0-43A0-AE5E-E274115E726B}">
+  <ds:schemaRefs>
+    <ds:schemaRef ds:uri="http://purl.org/dc/terms/"/>
+    <ds:schemaRef ds:uri="http://schemas.openxmlformats.org/package/2006/metadata/core-properties"/>
+    <ds:schemaRef ds:uri="http://schemas.microsoft.com/office/2006/documentManagement/types"/>
+    <ds:schemaRef ds:uri="http://purl.org/dc/elements/1.1/"/>
+    <ds:schemaRef ds:uri="http://schemas.microsoft.com/office/2006/metadata/properties"/>
+    <ds:schemaRef ds:uri="http://www.w3.org/XML/1998/namespace"/>
+    <ds:schemaRef ds:uri="http://purl.org/dc/dcmitype/"/>
+  </ds:schemaRefs>
+</ds:datastoreItem>
+</file>
+
+<file path=customXml/itemProps3.xml><?xml version="1.0" encoding="utf-8"?>
+<ds:datastoreItem xmlns:ds="http://schemas.openxmlformats.org/officeDocument/2006/customXml" ds:itemID="{19E20559-B232-4371-8690-E3D8007EDB82}">
+  <ds:schemaRefs>
+    <ds:schemaRef ds:uri="http://schemas.microsoft.com/sharepoint/v3/contenttype/forms"/>
+  </ds:schemaRefs>
+</ds:datastoreItem>
 </file>
</xml_diff>